<commit_message>
Add report and presentation files.
</commit_message>
<xml_diff>
--- a/images/ScarlettYang_OnePageSlide.pptx
+++ b/images/ScarlettYang_OnePageSlide.pptx
@@ -104,6 +104,11 @@
       </a:defRPr>
     </a:lvl9pPr>
   </p:defaultTextStyle>
+  <p:extLst>
+    <p:ext uri="{EFAFB233-063F-42B5-8137-9DF3F51BA10A}">
+      <p15:sldGuideLst xmlns:p15="http://schemas.microsoft.com/office/powerpoint/2012/main"/>
+    </p:ext>
+  </p:extLst>
 </p:presentation>
 </file>
 
@@ -260,7 +265,7 @@
           <a:p>
             <a:fld id="{C128FA71-3A18-48C0-980F-4B68F7F63042}" type="datetime1">
               <a:rPr lang="en-US" smtClean="0"/>
-              <a:t>3/28/25</a:t>
+              <a:t>4/1/25</a:t>
             </a:fld>
             <a:endParaRPr lang="en-US"/>
           </a:p>
@@ -468,7 +473,7 @@
           <a:p>
             <a:fld id="{7104EDB3-C0E8-45F8-9E1D-1B6C8D1880C0}" type="datetime1">
               <a:rPr lang="en-US" smtClean="0"/>
-              <a:t>3/28/25</a:t>
+              <a:t>4/1/25</a:t>
             </a:fld>
             <a:endParaRPr lang="en-US"/>
           </a:p>
@@ -678,7 +683,7 @@
           <a:p>
             <a:fld id="{9CF0EC4B-54ED-4041-B552-9BA760FA3DBA}" type="datetime1">
               <a:rPr lang="en-US" smtClean="0"/>
-              <a:t>3/28/25</a:t>
+              <a:t>4/1/25</a:t>
             </a:fld>
             <a:endParaRPr lang="en-US"/>
           </a:p>
@@ -876,7 +881,7 @@
           <a:p>
             <a:fld id="{51C1210E-201E-4473-82AC-2466F5386C38}" type="datetime1">
               <a:rPr lang="en-US" smtClean="0"/>
-              <a:t>3/28/25</a:t>
+              <a:t>4/1/25</a:t>
             </a:fld>
             <a:endParaRPr lang="en-US"/>
           </a:p>
@@ -1154,7 +1159,7 @@
           <a:p>
             <a:fld id="{B01EA198-6CAB-4B8F-B93F-1F9C8C4B6CE7}" type="datetime1">
               <a:rPr lang="en-US" smtClean="0"/>
-              <a:t>3/28/25</a:t>
+              <a:t>4/1/25</a:t>
             </a:fld>
             <a:endParaRPr lang="en-US"/>
           </a:p>
@@ -1426,7 +1431,7 @@
           <a:p>
             <a:fld id="{CA06041F-4525-44D5-AA4F-332294BF1F56}" type="datetime1">
               <a:rPr lang="en-US" smtClean="0"/>
-              <a:t>3/28/25</a:t>
+              <a:t>4/1/25</a:t>
             </a:fld>
             <a:endParaRPr lang="en-US"/>
           </a:p>
@@ -1850,7 +1855,7 @@
           <a:p>
             <a:fld id="{F9557091-BBDF-4EB9-BA6B-2BB67AC4FC0F}" type="datetime1">
               <a:rPr lang="en-US" smtClean="0"/>
-              <a:t>3/28/25</a:t>
+              <a:t>4/1/25</a:t>
             </a:fld>
             <a:endParaRPr lang="en-US"/>
           </a:p>
@@ -1991,7 +1996,7 @@
           <a:p>
             <a:fld id="{2D6B226B-77A6-410C-9796-083F278E0125}" type="datetime1">
               <a:rPr lang="en-US" smtClean="0"/>
-              <a:t>3/28/25</a:t>
+              <a:t>4/1/25</a:t>
             </a:fld>
             <a:endParaRPr lang="en-US"/>
           </a:p>
@@ -2104,7 +2109,7 @@
           <a:p>
             <a:fld id="{A23A578B-D289-4C40-8593-3D356C49DA58}" type="datetime1">
               <a:rPr lang="en-US" smtClean="0"/>
-              <a:t>3/28/25</a:t>
+              <a:t>4/1/25</a:t>
             </a:fld>
             <a:endParaRPr lang="en-US"/>
           </a:p>
@@ -2423,7 +2428,7 @@
           <a:p>
             <a:fld id="{713DFAE3-14DB-48A7-A80F-80DDB072CE3D}" type="datetime1">
               <a:rPr lang="en-US" smtClean="0"/>
-              <a:t>3/28/25</a:t>
+              <a:t>4/1/25</a:t>
             </a:fld>
             <a:endParaRPr lang="en-US"/>
           </a:p>
@@ -2717,7 +2722,7 @@
           <a:p>
             <a:fld id="{92C5EAEF-6478-4102-8F5D-A5FE9FC97ACB}" type="datetime1">
               <a:rPr lang="en-US" smtClean="0"/>
-              <a:t>3/28/25</a:t>
+              <a:t>4/1/25</a:t>
             </a:fld>
             <a:endParaRPr lang="en-US"/>
           </a:p>
@@ -2958,7 +2963,7 @@
           <a:p>
             <a:fld id="{67F45AC6-C491-4585-A584-9CE2AF7D5500}" type="datetime1">
               <a:rPr lang="en-US" smtClean="0"/>
-              <a:t>3/28/25</a:t>
+              <a:t>4/1/25</a:t>
             </a:fld>
             <a:endParaRPr lang="en-US"/>
           </a:p>
@@ -3881,17 +3886,43 @@
                 <a:effectLst/>
                 <a:latin typeface="Aptos" panose="020B0004020202020204" pitchFamily="34" charset="0"/>
               </a:rPr>
-              <a:t> 72.8% with PCA features).</a:t>
+              <a:t> 7</a:t>
             </a:r>
             <a:r>
               <a:rPr lang="en-US" altLang="zh-CN" sz="1800" i="0" dirty="0">
                 <a:effectLst/>
                 <a:latin typeface="Aptos" panose="020B0004020202020204" pitchFamily="34" charset="0"/>
               </a:rPr>
+              <a:t>2</a:t>
+            </a:r>
+            <a:r>
+              <a:rPr lang="en-US" sz="1800" i="0" dirty="0">
+                <a:effectLst/>
+                <a:latin typeface="Aptos" panose="020B0004020202020204" pitchFamily="34" charset="0"/>
+              </a:rPr>
+              <a:t>% with PCA features).</a:t>
+            </a:r>
+          </a:p>
+          <a:p>
+            <a:pPr marL="857250" indent="-228600" algn="l">
+              <a:lnSpc>
+                <a:spcPct val="100000"/>
+              </a:lnSpc>
+              <a:spcBef>
+                <a:spcPts val="300"/>
+              </a:spcBef>
+              <a:buFont typeface="Arial" panose="020B0604020202020204" pitchFamily="34" charset="0"/>
+              <a:buChar char="•"/>
+            </a:pPr>
+            <a:r>
+              <a:rPr lang="en-US" altLang="zh-CN" sz="1600" i="0" dirty="0">
+                <a:effectLst/>
+                <a:latin typeface="Aptos" panose="020B0004020202020204" pitchFamily="34" charset="0"/>
+              </a:rPr>
               <a:t>Contribution</a:t>
             </a:r>
             <a:r>
-              <a:rPr lang="en-US" sz="1800" i="0" dirty="0">
+              <a:rPr lang="en-US" sz="1600" i="0" dirty="0">
                 <a:effectLst/>
                 <a:latin typeface="Aptos" panose="020B0004020202020204" pitchFamily="34" charset="0"/>
               </a:rPr>

</xml_diff>